<commit_message>
Add projeto de encontrar raizes com Bhaskara
</commit_message>
<xml_diff>
--- a/Aula 01/Aula 01.pptx
+++ b/Aula 01/Aula 01.pptx
@@ -203,7 +203,8 @@
           <a:p>
             <a:fld id="{CDA8A7F6-3914-469C-A6E9-40923DB352E9}" type="datetimeFigureOut">
               <a:rPr lang="pt-BR" smtClean="0"/>
-              <a:t>27/08/2014</a:t>
+              <a:pPr/>
+              <a:t>10/09/2014</a:t>
             </a:fld>
             <a:endParaRPr lang="pt-BR"/>
           </a:p>
@@ -364,6 +365,7 @@
           <a:p>
             <a:fld id="{ECC1D7F6-49BF-404C-9D26-565182C5FD82}" type="slidenum">
               <a:rPr lang="pt-BR" smtClean="0"/>
+              <a:pPr/>
               <a:t>‹nº›</a:t>
             </a:fld>
             <a:endParaRPr lang="pt-BR"/>
@@ -1093,7 +1095,8 @@
           <a:p>
             <a:fld id="{F3B9BC5B-4239-48BA-91AF-B1A90F2D50F7}" type="datetimeFigureOut">
               <a:rPr lang="pt-BR" smtClean="0"/>
-              <a:t>27/08/2014</a:t>
+              <a:pPr/>
+              <a:t>10/09/2014</a:t>
             </a:fld>
             <a:endParaRPr lang="pt-BR"/>
           </a:p>
@@ -1155,6 +1158,7 @@
           <a:p>
             <a:fld id="{24C2860E-84C9-4433-9B2D-98DE2AD674CC}" type="slidenum">
               <a:rPr lang="pt-BR" smtClean="0"/>
+              <a:pPr/>
               <a:t>‹nº›</a:t>
             </a:fld>
             <a:endParaRPr lang="pt-BR"/>
@@ -1289,7 +1293,8 @@
           <a:p>
             <a:fld id="{F3B9BC5B-4239-48BA-91AF-B1A90F2D50F7}" type="datetimeFigureOut">
               <a:rPr lang="pt-BR" smtClean="0"/>
-              <a:t>27/08/2014</a:t>
+              <a:pPr/>
+              <a:t>10/09/2014</a:t>
             </a:fld>
             <a:endParaRPr lang="pt-BR"/>
           </a:p>
@@ -1335,6 +1340,7 @@
           <a:p>
             <a:fld id="{24C2860E-84C9-4433-9B2D-98DE2AD674CC}" type="slidenum">
               <a:rPr lang="pt-BR" smtClean="0"/>
+              <a:pPr/>
               <a:t>‹nº›</a:t>
             </a:fld>
             <a:endParaRPr lang="pt-BR"/>
@@ -1474,7 +1480,8 @@
           <a:p>
             <a:fld id="{F3B9BC5B-4239-48BA-91AF-B1A90F2D50F7}" type="datetimeFigureOut">
               <a:rPr lang="pt-BR" smtClean="0"/>
-              <a:t>27/08/2014</a:t>
+              <a:pPr/>
+              <a:t>10/09/2014</a:t>
             </a:fld>
             <a:endParaRPr lang="pt-BR"/>
           </a:p>
@@ -1520,6 +1527,7 @@
           <a:p>
             <a:fld id="{24C2860E-84C9-4433-9B2D-98DE2AD674CC}" type="slidenum">
               <a:rPr lang="pt-BR" smtClean="0"/>
+              <a:pPr/>
               <a:t>‹nº›</a:t>
             </a:fld>
             <a:endParaRPr lang="pt-BR"/>
@@ -1624,7 +1632,8 @@
           <a:p>
             <a:fld id="{F3B9BC5B-4239-48BA-91AF-B1A90F2D50F7}" type="datetimeFigureOut">
               <a:rPr lang="pt-BR" smtClean="0"/>
-              <a:t>27/08/2014</a:t>
+              <a:pPr/>
+              <a:t>10/09/2014</a:t>
             </a:fld>
             <a:endParaRPr lang="pt-BR"/>
           </a:p>
@@ -1670,6 +1679,7 @@
           <a:p>
             <a:fld id="{24C2860E-84C9-4433-9B2D-98DE2AD674CC}" type="slidenum">
               <a:rPr lang="pt-BR" smtClean="0"/>
+              <a:pPr/>
               <a:t>‹nº›</a:t>
             </a:fld>
             <a:endParaRPr lang="pt-BR"/>
@@ -1879,7 +1889,8 @@
           <a:p>
             <a:fld id="{F3B9BC5B-4239-48BA-91AF-B1A90F2D50F7}" type="datetimeFigureOut">
               <a:rPr lang="pt-BR" smtClean="0"/>
-              <a:t>27/08/2014</a:t>
+              <a:pPr/>
+              <a:t>10/09/2014</a:t>
             </a:fld>
             <a:endParaRPr lang="pt-BR"/>
           </a:p>
@@ -1925,6 +1936,7 @@
           <a:p>
             <a:fld id="{24C2860E-84C9-4433-9B2D-98DE2AD674CC}" type="slidenum">
               <a:rPr lang="pt-BR" smtClean="0"/>
+              <a:pPr/>
               <a:t>‹nº›</a:t>
             </a:fld>
             <a:endParaRPr lang="pt-BR"/>
@@ -2288,7 +2300,8 @@
           <a:p>
             <a:fld id="{F3B9BC5B-4239-48BA-91AF-B1A90F2D50F7}" type="datetimeFigureOut">
               <a:rPr lang="pt-BR" smtClean="0"/>
-              <a:t>27/08/2014</a:t>
+              <a:pPr/>
+              <a:t>10/09/2014</a:t>
             </a:fld>
             <a:endParaRPr lang="pt-BR"/>
           </a:p>
@@ -2334,6 +2347,7 @@
           <a:p>
             <a:fld id="{24C2860E-84C9-4433-9B2D-98DE2AD674CC}" type="slidenum">
               <a:rPr lang="pt-BR" smtClean="0"/>
+              <a:pPr/>
               <a:t>‹nº›</a:t>
             </a:fld>
             <a:endParaRPr lang="pt-BR"/>
@@ -2734,7 +2748,8 @@
           <a:p>
             <a:fld id="{F3B9BC5B-4239-48BA-91AF-B1A90F2D50F7}" type="datetimeFigureOut">
               <a:rPr lang="pt-BR" smtClean="0"/>
-              <a:t>27/08/2014</a:t>
+              <a:pPr/>
+              <a:t>10/09/2014</a:t>
             </a:fld>
             <a:endParaRPr lang="pt-BR"/>
           </a:p>
@@ -2780,6 +2795,7 @@
           <a:p>
             <a:fld id="{24C2860E-84C9-4433-9B2D-98DE2AD674CC}" type="slidenum">
               <a:rPr lang="pt-BR" smtClean="0"/>
+              <a:pPr/>
               <a:t>‹nº›</a:t>
             </a:fld>
             <a:endParaRPr lang="pt-BR"/>
@@ -2835,7 +2851,8 @@
           <a:p>
             <a:fld id="{F3B9BC5B-4239-48BA-91AF-B1A90F2D50F7}" type="datetimeFigureOut">
               <a:rPr lang="pt-BR" smtClean="0"/>
-              <a:t>27/08/2014</a:t>
+              <a:pPr/>
+              <a:t>10/09/2014</a:t>
             </a:fld>
             <a:endParaRPr lang="pt-BR"/>
           </a:p>
@@ -2881,6 +2898,7 @@
           <a:p>
             <a:fld id="{24C2860E-84C9-4433-9B2D-98DE2AD674CC}" type="slidenum">
               <a:rPr lang="pt-BR" smtClean="0"/>
+              <a:pPr/>
               <a:t>‹nº›</a:t>
             </a:fld>
             <a:endParaRPr lang="pt-BR"/>
@@ -2956,7 +2974,8 @@
           <a:p>
             <a:fld id="{F3B9BC5B-4239-48BA-91AF-B1A90F2D50F7}" type="datetimeFigureOut">
               <a:rPr lang="pt-BR" smtClean="0"/>
-              <a:t>27/08/2014</a:t>
+              <a:pPr/>
+              <a:t>10/09/2014</a:t>
             </a:fld>
             <a:endParaRPr lang="pt-BR"/>
           </a:p>
@@ -3002,6 +3021,7 @@
           <a:p>
             <a:fld id="{24C2860E-84C9-4433-9B2D-98DE2AD674CC}" type="slidenum">
               <a:rPr lang="pt-BR" smtClean="0"/>
+              <a:pPr/>
               <a:t>‹nº›</a:t>
             </a:fld>
             <a:endParaRPr lang="pt-BR"/>
@@ -3230,7 +3250,8 @@
           <a:p>
             <a:fld id="{F3B9BC5B-4239-48BA-91AF-B1A90F2D50F7}" type="datetimeFigureOut">
               <a:rPr lang="pt-BR" smtClean="0"/>
-              <a:t>27/08/2014</a:t>
+              <a:pPr/>
+              <a:t>10/09/2014</a:t>
             </a:fld>
             <a:endParaRPr lang="pt-BR"/>
           </a:p>
@@ -3276,6 +3297,7 @@
           <a:p>
             <a:fld id="{24C2860E-84C9-4433-9B2D-98DE2AD674CC}" type="slidenum">
               <a:rPr lang="pt-BR" smtClean="0"/>
+              <a:pPr/>
               <a:t>‹nº›</a:t>
             </a:fld>
             <a:endParaRPr lang="pt-BR"/>
@@ -3435,7 +3457,8 @@
           <a:p>
             <a:fld id="{F3B9BC5B-4239-48BA-91AF-B1A90F2D50F7}" type="datetimeFigureOut">
               <a:rPr lang="pt-BR" smtClean="0"/>
-              <a:t>27/08/2014</a:t>
+              <a:pPr/>
+              <a:t>10/09/2014</a:t>
             </a:fld>
             <a:endParaRPr lang="pt-BR"/>
           </a:p>
@@ -3500,6 +3523,7 @@
           <a:p>
             <a:fld id="{24C2860E-84C9-4433-9B2D-98DE2AD674CC}" type="slidenum">
               <a:rPr lang="pt-BR" smtClean="0"/>
+              <a:pPr/>
               <a:t>‹nº›</a:t>
             </a:fld>
             <a:endParaRPr lang="pt-BR"/>
@@ -4544,7 +4568,8 @@
           <a:p>
             <a:fld id="{F3B9BC5B-4239-48BA-91AF-B1A90F2D50F7}" type="datetimeFigureOut">
               <a:rPr lang="pt-BR" smtClean="0"/>
-              <a:t>27/08/2014</a:t>
+              <a:pPr/>
+              <a:t>10/09/2014</a:t>
             </a:fld>
             <a:endParaRPr lang="pt-BR"/>
           </a:p>
@@ -4620,6 +4645,7 @@
           <a:p>
             <a:fld id="{24C2860E-84C9-4433-9B2D-98DE2AD674CC}" type="slidenum">
               <a:rPr lang="pt-BR" smtClean="0"/>
+              <a:pPr/>
               <a:t>‹nº›</a:t>
             </a:fld>
             <a:endParaRPr lang="pt-BR"/>
@@ -5044,15 +5070,7 @@
             </a:r>
             <a:r>
               <a:rPr lang="pt-BR" dirty="0" smtClean="0"/>
-              <a:t>-</a:t>
-            </a:r>
-            <a:r>
-              <a:rPr lang="pt-BR" dirty="0" smtClean="0"/>
-              <a:t> Dep. de Ciência da Computação,</a:t>
-            </a:r>
-            <a:r>
-              <a:rPr lang="pt-BR" dirty="0" smtClean="0"/>
-              <a:t> Universidade de Brasília</a:t>
+              <a:t>- Dep. de Ciência da Computação, Universidade de Brasília</a:t>
             </a:r>
             <a:endParaRPr lang="pt-BR" dirty="0"/>
           </a:p>
@@ -5271,6 +5289,35 @@
               <a:rPr lang="pt-BR" dirty="0" smtClean="0"/>
               <a:t>”</a:t>
             </a:r>
+          </a:p>
+          <a:p>
+            <a:endParaRPr lang="pt-BR" smtClean="0"/>
+          </a:p>
+          <a:p>
+            <a:r>
+              <a:rPr lang="pt-BR" smtClean="0"/>
+              <a:t>Encontrar </a:t>
+            </a:r>
+            <a:r>
+              <a:rPr lang="pt-BR" dirty="0" smtClean="0"/>
+              <a:t>raízes de uma equação de segundo grau, usando </a:t>
+            </a:r>
+            <a:r>
+              <a:rPr lang="pt-BR" dirty="0" err="1" smtClean="0"/>
+              <a:t>Bhaskara</a:t>
+            </a:r>
+            <a:r>
+              <a:rPr lang="pt-BR" dirty="0" smtClean="0"/>
+              <a:t> (“aula_01_cod_2.</a:t>
+            </a:r>
+            <a:r>
+              <a:rPr lang="pt-BR" dirty="0" err="1" smtClean="0"/>
+              <a:t>ino</a:t>
+            </a:r>
+            <a:r>
+              <a:rPr lang="pt-BR" dirty="0" smtClean="0"/>
+              <a:t>”)</a:t>
+            </a:r>
             <a:endParaRPr lang="pt-BR" dirty="0"/>
           </a:p>
         </p:txBody>
@@ -5481,35 +5528,11 @@
           <a:p>
             <a:r>
               <a:rPr lang="pt-BR" dirty="0" smtClean="0"/>
-              <a:t>De maneira bem simplificada, um</a:t>
-            </a:r>
-            <a:r>
-              <a:rPr lang="pt-BR" dirty="0" smtClean="0"/>
-              <a:t> </a:t>
-            </a:r>
-            <a:r>
-              <a:rPr lang="pt-BR" dirty="0" smtClean="0"/>
-              <a:t>algoritmo</a:t>
-            </a:r>
-            <a:r>
-              <a:rPr lang="pt-BR" dirty="0" smtClean="0"/>
-              <a:t> é uma sequência </a:t>
-            </a:r>
-            <a:r>
-              <a:rPr lang="pt-BR" dirty="0" smtClean="0"/>
-              <a:t>de instruções bem </a:t>
-            </a:r>
-            <a:r>
-              <a:rPr lang="pt-BR" dirty="0" smtClean="0"/>
-              <a:t>definidas e </a:t>
+              <a:t>De maneira bem simplificada, um algoritmo é uma sequência de instruções bem definidas e </a:t>
             </a:r>
             <a:r>
               <a:rPr lang="pt-BR" b="1" u="sng" dirty="0" smtClean="0"/>
-              <a:t>não </a:t>
-            </a:r>
-            <a:r>
-              <a:rPr lang="pt-BR" b="1" u="sng" dirty="0" smtClean="0"/>
-              <a:t>ambíguas</a:t>
+              <a:t>não ambíguas</a:t>
             </a:r>
             <a:r>
               <a:rPr lang="pt-BR" dirty="0" smtClean="0"/>
@@ -5937,7 +5960,6 @@
               <a:rPr lang="pt-BR" dirty="0" smtClean="0"/>
               <a:t>2. Acrescentar as gemas uma a uma, batendo sempre, até levantar bolhas.</a:t>
             </a:r>
-            <a:endParaRPr lang="pt-BR" dirty="0" smtClean="0"/>
           </a:p>
           <a:p>
             <a:endParaRPr lang="pt-BR" dirty="0" smtClean="0"/>
@@ -6126,11 +6148,7 @@
           <a:p>
             <a:r>
               <a:rPr lang="pt-BR" dirty="0" smtClean="0"/>
-              <a:t>Cada pessoa pode fazer o seu bolo de maneira diferente, mas o resultado final é o </a:t>
-            </a:r>
-            <a:r>
-              <a:rPr lang="pt-BR" dirty="0" smtClean="0"/>
-              <a:t>mesmo (ou parecido).</a:t>
+              <a:t>Cada pessoa pode fazer o seu bolo de maneira diferente, mas o resultado final é o mesmo (ou parecido).</a:t>
             </a:r>
           </a:p>
           <a:p>

</xml_diff>

<commit_message>
Added IEEE Day 2014 presentations and Facebook link to all classes
</commit_message>
<xml_diff>
--- a/Aula 01/Aula 01.pptx
+++ b/Aula 01/Aula 01.pptx
@@ -5,21 +5,22 @@
     <p:sldMasterId id="2147483720" r:id="rId1"/>
   </p:sldMasterIdLst>
   <p:notesMasterIdLst>
-    <p:notesMasterId r:id="rId14"/>
+    <p:notesMasterId r:id="rId15"/>
   </p:notesMasterIdLst>
   <p:sldIdLst>
     <p:sldId id="256" r:id="rId2"/>
-    <p:sldId id="260" r:id="rId3"/>
-    <p:sldId id="257" r:id="rId4"/>
-    <p:sldId id="258" r:id="rId5"/>
-    <p:sldId id="261" r:id="rId6"/>
-    <p:sldId id="262" r:id="rId7"/>
-    <p:sldId id="263" r:id="rId8"/>
-    <p:sldId id="268" r:id="rId9"/>
-    <p:sldId id="264" r:id="rId10"/>
-    <p:sldId id="265" r:id="rId11"/>
-    <p:sldId id="266" r:id="rId12"/>
-    <p:sldId id="267" r:id="rId13"/>
+    <p:sldId id="269" r:id="rId3"/>
+    <p:sldId id="260" r:id="rId4"/>
+    <p:sldId id="257" r:id="rId5"/>
+    <p:sldId id="258" r:id="rId6"/>
+    <p:sldId id="261" r:id="rId7"/>
+    <p:sldId id="262" r:id="rId8"/>
+    <p:sldId id="263" r:id="rId9"/>
+    <p:sldId id="268" r:id="rId10"/>
+    <p:sldId id="264" r:id="rId11"/>
+    <p:sldId id="265" r:id="rId12"/>
+    <p:sldId id="266" r:id="rId13"/>
+    <p:sldId id="267" r:id="rId14"/>
   </p:sldIdLst>
   <p:sldSz cx="9144000" cy="6858000" type="screen4x3"/>
   <p:notesSz cx="6858000" cy="9144000"/>
@@ -220,7 +221,7 @@
             <a:fld id="{CDA8A7F6-3914-469C-A6E9-40923DB352E9}" type="datetimeFigureOut">
               <a:rPr lang="pt-BR" smtClean="0"/>
               <a:pPr/>
-              <a:t>11/09/2014</a:t>
+              <a:t>06/10/2014</a:t>
             </a:fld>
             <a:endParaRPr lang="pt-BR"/>
           </a:p>
@@ -1117,7 +1118,7 @@
             <a:fld id="{F3B9BC5B-4239-48BA-91AF-B1A90F2D50F7}" type="datetimeFigureOut">
               <a:rPr lang="pt-BR" smtClean="0"/>
               <a:pPr/>
-              <a:t>11/09/2014</a:t>
+              <a:t>06/10/2014</a:t>
             </a:fld>
             <a:endParaRPr lang="pt-BR"/>
           </a:p>
@@ -1315,7 +1316,7 @@
             <a:fld id="{F3B9BC5B-4239-48BA-91AF-B1A90F2D50F7}" type="datetimeFigureOut">
               <a:rPr lang="pt-BR" smtClean="0"/>
               <a:pPr/>
-              <a:t>11/09/2014</a:t>
+              <a:t>06/10/2014</a:t>
             </a:fld>
             <a:endParaRPr lang="pt-BR"/>
           </a:p>
@@ -1502,7 +1503,7 @@
             <a:fld id="{F3B9BC5B-4239-48BA-91AF-B1A90F2D50F7}" type="datetimeFigureOut">
               <a:rPr lang="pt-BR" smtClean="0"/>
               <a:pPr/>
-              <a:t>11/09/2014</a:t>
+              <a:t>06/10/2014</a:t>
             </a:fld>
             <a:endParaRPr lang="pt-BR"/>
           </a:p>
@@ -1654,7 +1655,7 @@
             <a:fld id="{F3B9BC5B-4239-48BA-91AF-B1A90F2D50F7}" type="datetimeFigureOut">
               <a:rPr lang="pt-BR" smtClean="0"/>
               <a:pPr/>
-              <a:t>11/09/2014</a:t>
+              <a:t>06/10/2014</a:t>
             </a:fld>
             <a:endParaRPr lang="pt-BR"/>
           </a:p>
@@ -1911,7 +1912,7 @@
             <a:fld id="{F3B9BC5B-4239-48BA-91AF-B1A90F2D50F7}" type="datetimeFigureOut">
               <a:rPr lang="pt-BR" smtClean="0"/>
               <a:pPr/>
-              <a:t>11/09/2014</a:t>
+              <a:t>06/10/2014</a:t>
             </a:fld>
             <a:endParaRPr lang="pt-BR"/>
           </a:p>
@@ -2322,7 +2323,7 @@
             <a:fld id="{F3B9BC5B-4239-48BA-91AF-B1A90F2D50F7}" type="datetimeFigureOut">
               <a:rPr lang="pt-BR" smtClean="0"/>
               <a:pPr/>
-              <a:t>11/09/2014</a:t>
+              <a:t>06/10/2014</a:t>
             </a:fld>
             <a:endParaRPr lang="pt-BR"/>
           </a:p>
@@ -2770,7 +2771,7 @@
             <a:fld id="{F3B9BC5B-4239-48BA-91AF-B1A90F2D50F7}" type="datetimeFigureOut">
               <a:rPr lang="pt-BR" smtClean="0"/>
               <a:pPr/>
-              <a:t>11/09/2014</a:t>
+              <a:t>06/10/2014</a:t>
             </a:fld>
             <a:endParaRPr lang="pt-BR"/>
           </a:p>
@@ -2873,7 +2874,7 @@
             <a:fld id="{F3B9BC5B-4239-48BA-91AF-B1A90F2D50F7}" type="datetimeFigureOut">
               <a:rPr lang="pt-BR" smtClean="0"/>
               <a:pPr/>
-              <a:t>11/09/2014</a:t>
+              <a:t>06/10/2014</a:t>
             </a:fld>
             <a:endParaRPr lang="pt-BR"/>
           </a:p>
@@ -2996,7 +2997,7 @@
             <a:fld id="{F3B9BC5B-4239-48BA-91AF-B1A90F2D50F7}" type="datetimeFigureOut">
               <a:rPr lang="pt-BR" smtClean="0"/>
               <a:pPr/>
-              <a:t>11/09/2014</a:t>
+              <a:t>06/10/2014</a:t>
             </a:fld>
             <a:endParaRPr lang="pt-BR"/>
           </a:p>
@@ -3272,7 +3273,7 @@
             <a:fld id="{F3B9BC5B-4239-48BA-91AF-B1A90F2D50F7}" type="datetimeFigureOut">
               <a:rPr lang="pt-BR" smtClean="0"/>
               <a:pPr/>
-              <a:t>11/09/2014</a:t>
+              <a:t>06/10/2014</a:t>
             </a:fld>
             <a:endParaRPr lang="pt-BR"/>
           </a:p>
@@ -3479,7 +3480,7 @@
             <a:fld id="{F3B9BC5B-4239-48BA-91AF-B1A90F2D50F7}" type="datetimeFigureOut">
               <a:rPr lang="pt-BR" smtClean="0"/>
               <a:pPr/>
-              <a:t>11/09/2014</a:t>
+              <a:t>06/10/2014</a:t>
             </a:fld>
             <a:endParaRPr lang="pt-BR"/>
           </a:p>
@@ -4590,7 +4591,7 @@
             <a:fld id="{F3B9BC5B-4239-48BA-91AF-B1A90F2D50F7}" type="datetimeFigureOut">
               <a:rPr lang="pt-BR" smtClean="0"/>
               <a:pPr/>
-              <a:t>11/09/2014</a:t>
+              <a:t>06/10/2014</a:t>
             </a:fld>
             <a:endParaRPr lang="pt-BR"/>
           </a:p>
@@ -5177,66 +5178,62 @@
           <a:chExt cx="0" cy="0"/>
         </a:xfrm>
       </p:grpSpPr>
+      <p:sp>
+        <p:nvSpPr>
+          <p:cNvPr id="2" name="Espaço Reservado para Conteúdo 1"/>
+          <p:cNvSpPr>
+            <a:spLocks noGrp="1"/>
+          </p:cNvSpPr>
+          <p:nvPr>
+            <p:ph idx="1"/>
+          </p:nvPr>
+        </p:nvSpPr>
+        <p:spPr/>
+        <p:txBody>
+          <a:bodyPr/>
+          <a:lstStyle/>
+          <a:p>
+            <a:r>
+              <a:rPr lang="pt-BR" dirty="0" smtClean="0"/>
+              <a:t>Para programar um computador, devemos usar um conjunto de comandos pré-existentes para dizer ao nosso robô o que ele deve fazer.</a:t>
+            </a:r>
+            <a:endParaRPr lang="pt-BR" dirty="0"/>
+          </a:p>
+        </p:txBody>
+      </p:sp>
+      <p:sp>
+        <p:nvSpPr>
+          <p:cNvPr id="3" name="Título 2"/>
+          <p:cNvSpPr>
+            <a:spLocks noGrp="1"/>
+          </p:cNvSpPr>
+          <p:nvPr>
+            <p:ph type="title"/>
+          </p:nvPr>
+        </p:nvSpPr>
+        <p:spPr/>
+        <p:txBody>
+          <a:bodyPr/>
+          <a:lstStyle/>
+          <a:p>
+            <a:r>
+              <a:rPr lang="pt-BR" dirty="0" smtClean="0"/>
+              <a:t>Algoritmos computacionais</a:t>
+            </a:r>
+            <a:endParaRPr lang="pt-BR" dirty="0"/>
+          </a:p>
+        </p:txBody>
+      </p:sp>
       <p:pic>
         <p:nvPicPr>
-          <p:cNvPr id="4" name="Espaço Reservado para Conteúdo 3" descr="estrutura_codigo.png"/>
-          <p:cNvPicPr>
-            <a:picLocks noGrp="1" noChangeAspect="1"/>
-          </p:cNvPicPr>
-          <p:nvPr>
-            <p:ph idx="1"/>
-          </p:nvPr>
-        </p:nvPicPr>
-        <p:blipFill>
-          <a:blip r:embed="rId2" cstate="print"/>
-          <a:stretch>
-            <a:fillRect/>
-          </a:stretch>
-        </p:blipFill>
-        <p:spPr>
-          <a:xfrm>
-            <a:off x="0" y="2060848"/>
-            <a:ext cx="9000256" cy="2629922"/>
-          </a:xfrm>
-        </p:spPr>
-      </p:pic>
-      <p:sp>
-        <p:nvSpPr>
-          <p:cNvPr id="3" name="Título 2"/>
-          <p:cNvSpPr>
-            <a:spLocks noGrp="1"/>
-          </p:cNvSpPr>
-          <p:nvPr>
-            <p:ph type="title"/>
-          </p:nvPr>
-        </p:nvSpPr>
-        <p:spPr/>
-        <p:txBody>
-          <a:bodyPr/>
-          <a:lstStyle/>
-          <a:p>
-            <a:r>
-              <a:rPr lang="pt-BR" dirty="0" smtClean="0"/>
-              <a:t>Programando com </a:t>
-            </a:r>
-            <a:r>
-              <a:rPr lang="pt-BR" dirty="0" err="1" smtClean="0"/>
-              <a:t>SparkiDuino</a:t>
-            </a:r>
-            <a:endParaRPr lang="pt-BR" dirty="0"/>
-          </a:p>
-        </p:txBody>
-      </p:sp>
-      <p:pic>
-        <p:nvPicPr>
-          <p:cNvPr id="5" name="Imagem 4" descr="ras-logo.png"/>
+          <p:cNvPr id="4" name="Imagem 3" descr="ras-logo.png"/>
           <p:cNvPicPr>
             <a:picLocks noChangeAspect="1"/>
           </p:cNvPicPr>
           <p:nvPr/>
         </p:nvPicPr>
         <p:blipFill>
-          <a:blip r:embed="rId3" cstate="print"/>
+          <a:blip r:embed="rId2" cstate="print"/>
           <a:stretch>
             <a:fillRect/>
           </a:stretch>
@@ -5283,14 +5280,37 @@
           <a:chExt cx="0" cy="0"/>
         </a:xfrm>
       </p:grpSpPr>
-      <p:sp>
-        <p:nvSpPr>
-          <p:cNvPr id="2" name="Espaço Reservado para Conteúdo 1"/>
-          <p:cNvSpPr>
-            <a:spLocks noGrp="1"/>
-          </p:cNvSpPr>
+      <p:pic>
+        <p:nvPicPr>
+          <p:cNvPr id="4" name="Espaço Reservado para Conteúdo 3" descr="estrutura_codigo.png"/>
+          <p:cNvPicPr>
+            <a:picLocks noGrp="1" noChangeAspect="1"/>
+          </p:cNvPicPr>
           <p:nvPr>
             <p:ph idx="1"/>
+          </p:nvPr>
+        </p:nvPicPr>
+        <p:blipFill>
+          <a:blip r:embed="rId2" cstate="print"/>
+          <a:stretch>
+            <a:fillRect/>
+          </a:stretch>
+        </p:blipFill>
+        <p:spPr>
+          <a:xfrm>
+            <a:off x="0" y="2060848"/>
+            <a:ext cx="9000256" cy="2629922"/>
+          </a:xfrm>
+        </p:spPr>
+      </p:pic>
+      <p:sp>
+        <p:nvSpPr>
+          <p:cNvPr id="3" name="Título 2"/>
+          <p:cNvSpPr>
+            <a:spLocks noGrp="1"/>
+          </p:cNvSpPr>
+          <p:nvPr>
+            <p:ph type="title"/>
           </p:nvPr>
         </p:nvSpPr>
         <p:spPr/>
@@ -5300,67 +5320,11 @@
           <a:p>
             <a:r>
               <a:rPr lang="pt-BR" dirty="0" smtClean="0"/>
-              <a:t>Rodar o código “aula_01_cod_1.</a:t>
+              <a:t>Programando com </a:t>
             </a:r>
             <a:r>
               <a:rPr lang="pt-BR" dirty="0" err="1" smtClean="0"/>
-              <a:t>ino</a:t>
-            </a:r>
-            <a:r>
-              <a:rPr lang="pt-BR" dirty="0" smtClean="0"/>
-              <a:t>”</a:t>
-            </a:r>
-          </a:p>
-          <a:p>
-            <a:endParaRPr lang="pt-BR" smtClean="0"/>
-          </a:p>
-          <a:p>
-            <a:r>
-              <a:rPr lang="pt-BR" smtClean="0"/>
-              <a:t>Encontrar </a:t>
-            </a:r>
-            <a:r>
-              <a:rPr lang="pt-BR" dirty="0" smtClean="0"/>
-              <a:t>raízes de uma equação de segundo grau, usando </a:t>
-            </a:r>
-            <a:r>
-              <a:rPr lang="pt-BR" dirty="0" err="1" smtClean="0"/>
-              <a:t>Bhaskara</a:t>
-            </a:r>
-            <a:r>
-              <a:rPr lang="pt-BR" dirty="0" smtClean="0"/>
-              <a:t> (“aula_01_cod_2.</a:t>
-            </a:r>
-            <a:r>
-              <a:rPr lang="pt-BR" dirty="0" err="1" smtClean="0"/>
-              <a:t>ino</a:t>
-            </a:r>
-            <a:r>
-              <a:rPr lang="pt-BR" dirty="0" smtClean="0"/>
-              <a:t>”)</a:t>
-            </a:r>
-            <a:endParaRPr lang="pt-BR" dirty="0"/>
-          </a:p>
-        </p:txBody>
-      </p:sp>
-      <p:sp>
-        <p:nvSpPr>
-          <p:cNvPr id="3" name="Título 2"/>
-          <p:cNvSpPr>
-            <a:spLocks noGrp="1"/>
-          </p:cNvSpPr>
-          <p:nvPr>
-            <p:ph type="title"/>
-          </p:nvPr>
-        </p:nvSpPr>
-        <p:spPr/>
-        <p:txBody>
-          <a:bodyPr/>
-          <a:lstStyle/>
-          <a:p>
-            <a:r>
-              <a:rPr lang="pt-BR" dirty="0" smtClean="0"/>
-              <a:t>Programando</a:t>
+              <a:t>SparkiDuino</a:t>
             </a:r>
             <a:endParaRPr lang="pt-BR" dirty="0"/>
           </a:p>
@@ -5368,14 +5332,14 @@
       </p:sp>
       <p:pic>
         <p:nvPicPr>
-          <p:cNvPr id="4" name="Imagem 3" descr="ras-logo.png"/>
+          <p:cNvPr id="5" name="Imagem 4" descr="ras-logo.png"/>
           <p:cNvPicPr>
             <a:picLocks noChangeAspect="1"/>
           </p:cNvPicPr>
           <p:nvPr/>
         </p:nvPicPr>
         <p:blipFill>
-          <a:blip r:embed="rId2" cstate="print"/>
+          <a:blip r:embed="rId3" cstate="print"/>
           <a:stretch>
             <a:fillRect/>
           </a:stretch>
@@ -5439,6 +5403,145 @@
           <a:p>
             <a:r>
               <a:rPr lang="pt-BR" dirty="0" smtClean="0"/>
+              <a:t>Rodar o código “aula_01_cod_1.</a:t>
+            </a:r>
+            <a:r>
+              <a:rPr lang="pt-BR" dirty="0" err="1" smtClean="0"/>
+              <a:t>ino</a:t>
+            </a:r>
+            <a:r>
+              <a:rPr lang="pt-BR" dirty="0" smtClean="0"/>
+              <a:t>”</a:t>
+            </a:r>
+          </a:p>
+          <a:p>
+            <a:endParaRPr lang="pt-BR" smtClean="0"/>
+          </a:p>
+          <a:p>
+            <a:r>
+              <a:rPr lang="pt-BR" smtClean="0"/>
+              <a:t>Encontrar </a:t>
+            </a:r>
+            <a:r>
+              <a:rPr lang="pt-BR" dirty="0" smtClean="0"/>
+              <a:t>raízes de uma equação de segundo grau, usando </a:t>
+            </a:r>
+            <a:r>
+              <a:rPr lang="pt-BR" dirty="0" err="1" smtClean="0"/>
+              <a:t>Bhaskara</a:t>
+            </a:r>
+            <a:r>
+              <a:rPr lang="pt-BR" dirty="0" smtClean="0"/>
+              <a:t> (“aula_01_cod_2.</a:t>
+            </a:r>
+            <a:r>
+              <a:rPr lang="pt-BR" dirty="0" err="1" smtClean="0"/>
+              <a:t>ino</a:t>
+            </a:r>
+            <a:r>
+              <a:rPr lang="pt-BR" dirty="0" smtClean="0"/>
+              <a:t>”)</a:t>
+            </a:r>
+            <a:endParaRPr lang="pt-BR" dirty="0"/>
+          </a:p>
+        </p:txBody>
+      </p:sp>
+      <p:sp>
+        <p:nvSpPr>
+          <p:cNvPr id="3" name="Título 2"/>
+          <p:cNvSpPr>
+            <a:spLocks noGrp="1"/>
+          </p:cNvSpPr>
+          <p:nvPr>
+            <p:ph type="title"/>
+          </p:nvPr>
+        </p:nvSpPr>
+        <p:spPr/>
+        <p:txBody>
+          <a:bodyPr/>
+          <a:lstStyle/>
+          <a:p>
+            <a:r>
+              <a:rPr lang="pt-BR" dirty="0" smtClean="0"/>
+              <a:t>Programando</a:t>
+            </a:r>
+            <a:endParaRPr lang="pt-BR" dirty="0"/>
+          </a:p>
+        </p:txBody>
+      </p:sp>
+      <p:pic>
+        <p:nvPicPr>
+          <p:cNvPr id="4" name="Imagem 3" descr="ras-logo.png"/>
+          <p:cNvPicPr>
+            <a:picLocks noChangeAspect="1"/>
+          </p:cNvPicPr>
+          <p:nvPr/>
+        </p:nvPicPr>
+        <p:blipFill>
+          <a:blip r:embed="rId2" cstate="print"/>
+          <a:stretch>
+            <a:fillRect/>
+          </a:stretch>
+        </p:blipFill>
+        <p:spPr>
+          <a:xfrm>
+            <a:off x="0" y="6121079"/>
+            <a:ext cx="1115615" cy="736921"/>
+          </a:xfrm>
+          <a:prstGeom prst="rect">
+            <a:avLst/>
+          </a:prstGeom>
+        </p:spPr>
+      </p:pic>
+    </p:spTree>
+  </p:cSld>
+  <p:clrMapOvr>
+    <a:masterClrMapping/>
+  </p:clrMapOvr>
+  <p:timing>
+    <p:tnLst>
+      <p:par>
+        <p:cTn id="1" dur="indefinite" restart="never" nodeType="tmRoot"/>
+      </p:par>
+    </p:tnLst>
+  </p:timing>
+</p:sld>
+</file>
+
+<file path=ppt/slides/slide13.xml><?xml version="1.0" encoding="utf-8"?>
+<p:sld xmlns:a="http://schemas.openxmlformats.org/drawingml/2006/main" xmlns:r="http://schemas.openxmlformats.org/officeDocument/2006/relationships" xmlns:p="http://schemas.openxmlformats.org/presentationml/2006/main">
+  <p:cSld>
+    <p:spTree>
+      <p:nvGrpSpPr>
+        <p:cNvPr id="1" name=""/>
+        <p:cNvGrpSpPr/>
+        <p:nvPr/>
+      </p:nvGrpSpPr>
+      <p:grpSpPr>
+        <a:xfrm>
+          <a:off x="0" y="0"/>
+          <a:ext cx="0" cy="0"/>
+          <a:chOff x="0" y="0"/>
+          <a:chExt cx="0" cy="0"/>
+        </a:xfrm>
+      </p:grpSpPr>
+      <p:sp>
+        <p:nvSpPr>
+          <p:cNvPr id="2" name="Espaço Reservado para Conteúdo 1"/>
+          <p:cNvSpPr>
+            <a:spLocks noGrp="1"/>
+          </p:cNvSpPr>
+          <p:nvPr>
+            <p:ph idx="1"/>
+          </p:nvPr>
+        </p:nvSpPr>
+        <p:spPr/>
+        <p:txBody>
+          <a:bodyPr/>
+          <a:lstStyle/>
+          <a:p>
+            <a:r>
+              <a:rPr lang="pt-BR" dirty="0" smtClean="0"/>
               <a:t>Fazendo o </a:t>
             </a:r>
             <a:r>
@@ -5470,11 +5573,7 @@
           <a:p>
             <a:r>
               <a:rPr lang="pt-BR" dirty="0" smtClean="0"/>
-              <a:t>Próxima </a:t>
-            </a:r>
-            <a:r>
-              <a:rPr lang="pt-BR" dirty="0" smtClean="0"/>
-              <a:t>aula...</a:t>
+              <a:t>Próxima aula...</a:t>
             </a:r>
             <a:endParaRPr lang="pt-BR" dirty="0"/>
           </a:p>
@@ -5546,22 +5645,55 @@
             <p:ph idx="1"/>
           </p:nvPr>
         </p:nvSpPr>
-        <p:spPr/>
+        <p:spPr>
+          <a:xfrm>
+            <a:off x="0" y="1481328"/>
+            <a:ext cx="9144000" cy="4525963"/>
+          </a:xfrm>
+        </p:spPr>
         <p:txBody>
           <a:bodyPr/>
           <a:lstStyle/>
           <a:p>
             <a:r>
               <a:rPr lang="pt-BR" dirty="0" smtClean="0"/>
-              <a:t>De maneira bem simplificada, um algoritmo é uma sequência de instruções bem definidas e </a:t>
-            </a:r>
-            <a:r>
-              <a:rPr lang="pt-BR" b="1" u="sng" dirty="0" smtClean="0"/>
-              <a:t>não ambíguas</a:t>
+              <a:t>Aulas</a:t>
+            </a:r>
+            <a:r>
+              <a:rPr lang="pt-BR" dirty="0"/>
+              <a:t>: https://github.com/mendelson/edubot</a:t>
+            </a:r>
+          </a:p>
+          <a:p>
+            <a:endParaRPr lang="pt-BR" dirty="0" smtClean="0"/>
+          </a:p>
+          <a:p>
+            <a:endParaRPr lang="pt-BR" dirty="0" smtClean="0"/>
+          </a:p>
+          <a:p>
+            <a:r>
+              <a:rPr lang="pt-BR" dirty="0" err="1" smtClean="0"/>
+              <a:t>Facebook</a:t>
+            </a:r>
+            <a:r>
+              <a:rPr lang="pt-BR" dirty="0"/>
+              <a:t>: https://</a:t>
             </a:r>
             <a:r>
               <a:rPr lang="pt-BR" dirty="0" smtClean="0"/>
-              <a:t>.</a:t>
+              <a:t>www.facebook.com/ieee.ras.unb</a:t>
+            </a:r>
+          </a:p>
+          <a:p>
+            <a:endParaRPr lang="pt-BR" dirty="0"/>
+          </a:p>
+          <a:p>
+            <a:endParaRPr lang="pt-BR" dirty="0" smtClean="0"/>
+          </a:p>
+          <a:p>
+            <a:r>
+              <a:rPr lang="pt-BR" dirty="0" smtClean="0"/>
+              <a:t>Dúvidas e contatos: cada professor irá disponibilizar um meio de contato.</a:t>
             </a:r>
             <a:endParaRPr lang="pt-BR" dirty="0"/>
           </a:p>
@@ -5584,7 +5716,7 @@
           <a:p>
             <a:r>
               <a:rPr lang="pt-BR" dirty="0" smtClean="0"/>
-              <a:t>Conceito</a:t>
+              <a:t>Links importantes</a:t>
             </a:r>
             <a:endParaRPr lang="pt-BR" dirty="0"/>
           </a:p>
@@ -5615,6 +5747,11 @@
         </p:spPr>
       </p:pic>
     </p:spTree>
+    <p:extLst>
+      <p:ext uri="{BB962C8B-B14F-4D97-AF65-F5344CB8AC3E}">
+        <p14:creationId xmlns:p14="http://schemas.microsoft.com/office/powerpoint/2010/main" val="2496132009"/>
+      </p:ext>
+    </p:extLst>
   </p:cSld>
   <p:clrMapOvr>
     <a:masterClrMapping/>
@@ -5663,35 +5800,15 @@
           <a:p>
             <a:r>
               <a:rPr lang="pt-BR" dirty="0" smtClean="0"/>
-              <a:t>Algoritmos computacionais: dizem ao computador (no nosso caso, o </a:t>
-            </a:r>
-            <a:r>
-              <a:rPr lang="pt-BR" dirty="0" err="1" smtClean="0"/>
-              <a:t>Sparki</a:t>
+              <a:t>De maneira bem simplificada, um algoritmo é uma sequência de instruções bem definidas e </a:t>
+            </a:r>
+            <a:r>
+              <a:rPr lang="pt-BR" b="1" u="sng" dirty="0" smtClean="0"/>
+              <a:t>não ambíguas</a:t>
             </a:r>
             <a:r>
               <a:rPr lang="pt-BR" dirty="0" smtClean="0"/>
-              <a:t>) o que fazer.</a:t>
-            </a:r>
-          </a:p>
-          <a:p>
-            <a:endParaRPr lang="pt-BR" dirty="0" smtClean="0"/>
-          </a:p>
-          <a:p>
-            <a:endParaRPr lang="pt-BR" dirty="0" smtClean="0"/>
-          </a:p>
-          <a:p>
-            <a:r>
-              <a:rPr lang="pt-BR" dirty="0" smtClean="0"/>
-              <a:t>Algoritmos </a:t>
-            </a:r>
-            <a:r>
-              <a:rPr lang="pt-BR" dirty="0" err="1" smtClean="0"/>
-              <a:t>não-computacionais</a:t>
-            </a:r>
-            <a:r>
-              <a:rPr lang="pt-BR" dirty="0" smtClean="0"/>
-              <a:t>: dizem às pessoas o que fazer, como em uma receita de bolo.</a:t>
+              <a:t>.</a:t>
             </a:r>
             <a:endParaRPr lang="pt-BR" dirty="0"/>
           </a:p>
@@ -5714,7 +5831,7 @@
           <a:p>
             <a:r>
               <a:rPr lang="pt-BR" dirty="0" smtClean="0"/>
-              <a:t>Tipos de Algoritmo</a:t>
+              <a:t>Conceito</a:t>
             </a:r>
             <a:endParaRPr lang="pt-BR" dirty="0"/>
           </a:p>
@@ -5722,7 +5839,7 @@
       </p:sp>
       <p:pic>
         <p:nvPicPr>
-          <p:cNvPr id="4" name="Imagem 3" descr="ras-logo.png"/>
+          <p:cNvPr id="6" name="Imagem 5" descr="ras-logo.png"/>
           <p:cNvPicPr>
             <a:picLocks noChangeAspect="1"/>
           </p:cNvPicPr>
@@ -5793,42 +5910,23 @@
           <a:p>
             <a:r>
               <a:rPr lang="pt-BR" dirty="0" smtClean="0"/>
-              <a:t>Qual o algoritmo (receita) para se fazer um bolo comum?</a:t>
+              <a:t>Algoritmos computacionais: dizem ao computador (no nosso caso, o </a:t>
+            </a:r>
+            <a:r>
+              <a:rPr lang="pt-BR" dirty="0" err="1" smtClean="0"/>
+              <a:t>Sparki</a:t>
+            </a:r>
+            <a:r>
+              <a:rPr lang="pt-BR" dirty="0" smtClean="0"/>
+              <a:t>) o que fazer.</a:t>
             </a:r>
           </a:p>
           <a:p>
             <a:endParaRPr lang="pt-BR" dirty="0" smtClean="0"/>
           </a:p>
           <a:p>
-            <a:pPr>
-              <a:buNone/>
-            </a:pPr>
             <a:endParaRPr lang="pt-BR" dirty="0" smtClean="0"/>
           </a:p>
-          <a:p>
-            <a:endParaRPr lang="pt-BR" dirty="0" smtClean="0"/>
-          </a:p>
-          <a:p>
-            <a:endParaRPr lang="pt-BR" dirty="0"/>
-          </a:p>
-        </p:txBody>
-      </p:sp>
-      <p:sp>
-        <p:nvSpPr>
-          <p:cNvPr id="3" name="Título 2"/>
-          <p:cNvSpPr>
-            <a:spLocks noGrp="1"/>
-          </p:cNvSpPr>
-          <p:nvPr>
-            <p:ph type="title"/>
-          </p:nvPr>
-        </p:nvSpPr>
-        <p:spPr/>
-        <p:txBody>
-          <a:bodyPr>
-            <a:normAutofit fontScale="90000"/>
-          </a:bodyPr>
-          <a:lstStyle/>
           <a:p>
             <a:r>
               <a:rPr lang="pt-BR" dirty="0" smtClean="0"/>
@@ -5837,6 +5935,33 @@
             <a:r>
               <a:rPr lang="pt-BR" dirty="0" err="1" smtClean="0"/>
               <a:t>não-computacionais</a:t>
+            </a:r>
+            <a:r>
+              <a:rPr lang="pt-BR" dirty="0" smtClean="0"/>
+              <a:t>: dizem às pessoas o que fazer, como em uma receita de bolo.</a:t>
+            </a:r>
+            <a:endParaRPr lang="pt-BR" dirty="0"/>
+          </a:p>
+        </p:txBody>
+      </p:sp>
+      <p:sp>
+        <p:nvSpPr>
+          <p:cNvPr id="3" name="Título 2"/>
+          <p:cNvSpPr>
+            <a:spLocks noGrp="1"/>
+          </p:cNvSpPr>
+          <p:nvPr>
+            <p:ph type="title"/>
+          </p:nvPr>
+        </p:nvSpPr>
+        <p:spPr/>
+        <p:txBody>
+          <a:bodyPr/>
+          <a:lstStyle/>
+          <a:p>
+            <a:r>
+              <a:rPr lang="pt-BR" dirty="0" smtClean="0"/>
+              <a:t>Tipos de Algoritmo</a:t>
             </a:r>
             <a:endParaRPr lang="pt-BR" dirty="0"/>
           </a:p>
@@ -5898,29 +6023,43 @@
           <a:chExt cx="0" cy="0"/>
         </a:xfrm>
       </p:grpSpPr>
-      <p:pic>
-        <p:nvPicPr>
-          <p:cNvPr id="6" name="Espaço Reservado para Conteúdo 5" descr="bolo.jpg"/>
-          <p:cNvPicPr>
-            <a:picLocks noGrp="1" noChangeAspect="1"/>
-          </p:cNvPicPr>
+      <p:sp>
+        <p:nvSpPr>
+          <p:cNvPr id="2" name="Espaço Reservado para Conteúdo 1"/>
+          <p:cNvSpPr>
+            <a:spLocks noGrp="1"/>
+          </p:cNvSpPr>
           <p:nvPr>
             <p:ph idx="1"/>
           </p:nvPr>
-        </p:nvPicPr>
-        <p:blipFill>
-          <a:blip r:embed="rId2" cstate="print"/>
-          <a:stretch>
-            <a:fillRect/>
-          </a:stretch>
-        </p:blipFill>
-        <p:spPr>
-          <a:xfrm>
-            <a:off x="0" y="1124744"/>
-            <a:ext cx="3190875" cy="3571875"/>
-          </a:xfrm>
-        </p:spPr>
-      </p:pic>
+        </p:nvSpPr>
+        <p:spPr/>
+        <p:txBody>
+          <a:bodyPr/>
+          <a:lstStyle/>
+          <a:p>
+            <a:r>
+              <a:rPr lang="pt-BR" dirty="0" smtClean="0"/>
+              <a:t>Qual o algoritmo (receita) para se fazer um bolo comum?</a:t>
+            </a:r>
+          </a:p>
+          <a:p>
+            <a:endParaRPr lang="pt-BR" dirty="0" smtClean="0"/>
+          </a:p>
+          <a:p>
+            <a:pPr>
+              <a:buNone/>
+            </a:pPr>
+            <a:endParaRPr lang="pt-BR" dirty="0" smtClean="0"/>
+          </a:p>
+          <a:p>
+            <a:endParaRPr lang="pt-BR" dirty="0" smtClean="0"/>
+          </a:p>
+          <a:p>
+            <a:endParaRPr lang="pt-BR" dirty="0"/>
+          </a:p>
+        </p:txBody>
+      </p:sp>
       <p:sp>
         <p:nvSpPr>
           <p:cNvPr id="3" name="Título 2"/>
@@ -5950,166 +6089,16 @@
           </a:p>
         </p:txBody>
       </p:sp>
-      <p:sp>
-        <p:nvSpPr>
-          <p:cNvPr id="7" name="CaixaDeTexto 6"/>
-          <p:cNvSpPr txBox="1"/>
-          <p:nvPr/>
-        </p:nvSpPr>
-        <p:spPr>
-          <a:xfrm>
-            <a:off x="3347865" y="1340768"/>
-            <a:ext cx="5796136" cy="5078313"/>
-          </a:xfrm>
-          <a:prstGeom prst="rect">
-            <a:avLst/>
-          </a:prstGeom>
-          <a:noFill/>
-        </p:spPr>
-        <p:txBody>
-          <a:bodyPr wrap="square" rtlCol="0">
-            <a:spAutoFit/>
-          </a:bodyPr>
-          <a:lstStyle/>
-          <a:p>
-            <a:r>
-              <a:rPr lang="pt-BR" dirty="0" smtClean="0"/>
-              <a:t>1. Bater o açúcar e a manteiga, com a essência de baunilha, até branquear.</a:t>
-            </a:r>
-          </a:p>
-          <a:p>
-            <a:endParaRPr lang="pt-BR" dirty="0"/>
-          </a:p>
-          <a:p>
-            <a:r>
-              <a:rPr lang="pt-BR" dirty="0" smtClean="0"/>
-              <a:t>2. Acrescentar as gemas uma a uma, batendo sempre, até levantar bolhas.</a:t>
-            </a:r>
-          </a:p>
-          <a:p>
-            <a:endParaRPr lang="pt-BR" dirty="0" smtClean="0"/>
-          </a:p>
-          <a:p>
-            <a:r>
-              <a:rPr lang="pt-BR" dirty="0" smtClean="0"/>
-              <a:t>3. </a:t>
-            </a:r>
-            <a:r>
-              <a:rPr lang="pt-BR" dirty="0"/>
-              <a:t>Peneirar a farinha, a </a:t>
-            </a:r>
-            <a:r>
-              <a:rPr lang="pt-BR" dirty="0" err="1"/>
-              <a:t>maizena</a:t>
-            </a:r>
-            <a:r>
-              <a:rPr lang="pt-BR" dirty="0"/>
-              <a:t> e o fermento </a:t>
-            </a:r>
-            <a:r>
-              <a:rPr lang="pt-BR" dirty="0" smtClean="0"/>
-              <a:t>e ir acrescentando, </a:t>
-            </a:r>
-            <a:r>
-              <a:rPr lang="pt-BR" dirty="0"/>
-              <a:t>pouco a pouco, </a:t>
-            </a:r>
-            <a:r>
-              <a:rPr lang="pt-BR" dirty="0" smtClean="0"/>
-              <a:t>alternando com </a:t>
-            </a:r>
-            <a:r>
-              <a:rPr lang="pt-BR" dirty="0"/>
-              <a:t>o leite, sem parar de bater</a:t>
-            </a:r>
-            <a:r>
-              <a:rPr lang="pt-BR" dirty="0" smtClean="0"/>
-              <a:t>.</a:t>
-            </a:r>
-          </a:p>
-          <a:p>
-            <a:endParaRPr lang="pt-BR" dirty="0" smtClean="0"/>
-          </a:p>
-          <a:p>
-            <a:r>
-              <a:rPr lang="pt-BR" dirty="0" smtClean="0"/>
-              <a:t>4. </a:t>
-            </a:r>
-            <a:r>
-              <a:rPr lang="pt-BR" dirty="0"/>
-              <a:t>Em separado, bater as claras em neve, com </a:t>
-            </a:r>
-            <a:r>
-              <a:rPr lang="pt-BR" dirty="0" smtClean="0"/>
-              <a:t>a pitada </a:t>
-            </a:r>
-            <a:r>
-              <a:rPr lang="pt-BR" dirty="0"/>
-              <a:t>de sal</a:t>
-            </a:r>
-            <a:r>
-              <a:rPr lang="pt-BR" dirty="0" smtClean="0"/>
-              <a:t>.</a:t>
-            </a:r>
-          </a:p>
-          <a:p>
-            <a:endParaRPr lang="pt-BR" dirty="0" smtClean="0"/>
-          </a:p>
-          <a:p>
-            <a:r>
-              <a:rPr lang="pt-BR" dirty="0" smtClean="0"/>
-              <a:t>5. </a:t>
-            </a:r>
-            <a:r>
-              <a:rPr lang="pt-BR" dirty="0"/>
-              <a:t>Misturar as claras delicadamente à </a:t>
-            </a:r>
-            <a:r>
-              <a:rPr lang="pt-BR" dirty="0" smtClean="0"/>
-              <a:t>mistura.</a:t>
-            </a:r>
-          </a:p>
-          <a:p>
-            <a:endParaRPr lang="pt-BR" dirty="0" smtClean="0"/>
-          </a:p>
-          <a:p>
-            <a:r>
-              <a:rPr lang="pt-BR" dirty="0" smtClean="0"/>
-              <a:t>6. </a:t>
-            </a:r>
-            <a:r>
-              <a:rPr lang="pt-BR" dirty="0"/>
-              <a:t>Assar em forma untada e polvilhada </a:t>
-            </a:r>
-            <a:r>
-              <a:rPr lang="pt-BR" dirty="0" smtClean="0"/>
-              <a:t>com farinha </a:t>
-            </a:r>
-            <a:r>
-              <a:rPr lang="pt-BR" dirty="0"/>
-              <a:t>de trigo, em forno médio, </a:t>
-            </a:r>
-            <a:r>
-              <a:rPr lang="pt-BR" dirty="0" smtClean="0"/>
-              <a:t>por aproximadamente </a:t>
-            </a:r>
-            <a:r>
-              <a:rPr lang="pt-BR" dirty="0"/>
-              <a:t>40 minutos.</a:t>
-            </a:r>
-          </a:p>
-        </p:txBody>
-      </p:sp>
       <p:pic>
         <p:nvPicPr>
-          <p:cNvPr id="8" name="Imagem 7" descr="ras-logo.png"/>
+          <p:cNvPr id="4" name="Imagem 3" descr="ras-logo.png"/>
           <p:cNvPicPr>
             <a:picLocks noChangeAspect="1"/>
           </p:cNvPicPr>
           <p:nvPr/>
         </p:nvPicPr>
         <p:blipFill>
-          <a:blip r:embed="rId3" cstate="print"/>
+          <a:blip r:embed="rId2" cstate="print"/>
           <a:stretch>
             <a:fillRect/>
           </a:stretch>
@@ -6156,38 +6145,29 @@
           <a:chExt cx="0" cy="0"/>
         </a:xfrm>
       </p:grpSpPr>
-      <p:sp>
-        <p:nvSpPr>
-          <p:cNvPr id="2" name="Espaço Reservado para Conteúdo 1"/>
-          <p:cNvSpPr>
-            <a:spLocks noGrp="1"/>
-          </p:cNvSpPr>
+      <p:pic>
+        <p:nvPicPr>
+          <p:cNvPr id="6" name="Espaço Reservado para Conteúdo 5" descr="bolo.jpg"/>
+          <p:cNvPicPr>
+            <a:picLocks noGrp="1" noChangeAspect="1"/>
+          </p:cNvPicPr>
           <p:nvPr>
             <p:ph idx="1"/>
           </p:nvPr>
-        </p:nvSpPr>
-        <p:spPr/>
-        <p:txBody>
-          <a:bodyPr/>
-          <a:lstStyle/>
-          <a:p>
-            <a:r>
-              <a:rPr lang="pt-BR" dirty="0" smtClean="0"/>
-              <a:t>Cada pessoa pode fazer o seu bolo de maneira diferente, mas o resultado final é o mesmo (ou parecido).</a:t>
-            </a:r>
-          </a:p>
-          <a:p>
-            <a:endParaRPr lang="pt-BR" dirty="0" smtClean="0"/>
-          </a:p>
-          <a:p>
-            <a:r>
-              <a:rPr lang="pt-BR" dirty="0" smtClean="0"/>
-              <a:t>Diferentes pessoas pensam de maneiras diferentes, ou seja, cada programador tem sua própria maneira de resolver um problema.</a:t>
-            </a:r>
-            <a:endParaRPr lang="pt-BR" dirty="0"/>
-          </a:p>
-        </p:txBody>
-      </p:sp>
+        </p:nvPicPr>
+        <p:blipFill>
+          <a:blip r:embed="rId2" cstate="print"/>
+          <a:stretch>
+            <a:fillRect/>
+          </a:stretch>
+        </p:blipFill>
+        <p:spPr>
+          <a:xfrm>
+            <a:off x="0" y="1124744"/>
+            <a:ext cx="3190875" cy="3571875"/>
+          </a:xfrm>
+        </p:spPr>
+      </p:pic>
       <p:sp>
         <p:nvSpPr>
           <p:cNvPr id="3" name="Título 2"/>
@@ -6217,16 +6197,166 @@
           </a:p>
         </p:txBody>
       </p:sp>
+      <p:sp>
+        <p:nvSpPr>
+          <p:cNvPr id="7" name="CaixaDeTexto 6"/>
+          <p:cNvSpPr txBox="1"/>
+          <p:nvPr/>
+        </p:nvSpPr>
+        <p:spPr>
+          <a:xfrm>
+            <a:off x="3347865" y="1340768"/>
+            <a:ext cx="5796136" cy="5078313"/>
+          </a:xfrm>
+          <a:prstGeom prst="rect">
+            <a:avLst/>
+          </a:prstGeom>
+          <a:noFill/>
+        </p:spPr>
+        <p:txBody>
+          <a:bodyPr wrap="square" rtlCol="0">
+            <a:spAutoFit/>
+          </a:bodyPr>
+          <a:lstStyle/>
+          <a:p>
+            <a:r>
+              <a:rPr lang="pt-BR" dirty="0" smtClean="0"/>
+              <a:t>1. Bater o açúcar e a manteiga, com a essência de baunilha, até branquear.</a:t>
+            </a:r>
+          </a:p>
+          <a:p>
+            <a:endParaRPr lang="pt-BR" dirty="0"/>
+          </a:p>
+          <a:p>
+            <a:r>
+              <a:rPr lang="pt-BR" dirty="0" smtClean="0"/>
+              <a:t>2. Acrescentar as gemas uma a uma, batendo sempre, até levantar bolhas.</a:t>
+            </a:r>
+          </a:p>
+          <a:p>
+            <a:endParaRPr lang="pt-BR" dirty="0" smtClean="0"/>
+          </a:p>
+          <a:p>
+            <a:r>
+              <a:rPr lang="pt-BR" dirty="0" smtClean="0"/>
+              <a:t>3. </a:t>
+            </a:r>
+            <a:r>
+              <a:rPr lang="pt-BR" dirty="0"/>
+              <a:t>Peneirar a farinha, a </a:t>
+            </a:r>
+            <a:r>
+              <a:rPr lang="pt-BR" dirty="0" err="1"/>
+              <a:t>maizena</a:t>
+            </a:r>
+            <a:r>
+              <a:rPr lang="pt-BR" dirty="0"/>
+              <a:t> e o fermento </a:t>
+            </a:r>
+            <a:r>
+              <a:rPr lang="pt-BR" dirty="0" smtClean="0"/>
+              <a:t>e ir acrescentando, </a:t>
+            </a:r>
+            <a:r>
+              <a:rPr lang="pt-BR" dirty="0"/>
+              <a:t>pouco a pouco, </a:t>
+            </a:r>
+            <a:r>
+              <a:rPr lang="pt-BR" dirty="0" smtClean="0"/>
+              <a:t>alternando com </a:t>
+            </a:r>
+            <a:r>
+              <a:rPr lang="pt-BR" dirty="0"/>
+              <a:t>o leite, sem parar de bater</a:t>
+            </a:r>
+            <a:r>
+              <a:rPr lang="pt-BR" dirty="0" smtClean="0"/>
+              <a:t>.</a:t>
+            </a:r>
+          </a:p>
+          <a:p>
+            <a:endParaRPr lang="pt-BR" dirty="0" smtClean="0"/>
+          </a:p>
+          <a:p>
+            <a:r>
+              <a:rPr lang="pt-BR" dirty="0" smtClean="0"/>
+              <a:t>4. </a:t>
+            </a:r>
+            <a:r>
+              <a:rPr lang="pt-BR" dirty="0"/>
+              <a:t>Em separado, bater as claras em neve, com </a:t>
+            </a:r>
+            <a:r>
+              <a:rPr lang="pt-BR" dirty="0" smtClean="0"/>
+              <a:t>a pitada </a:t>
+            </a:r>
+            <a:r>
+              <a:rPr lang="pt-BR" dirty="0"/>
+              <a:t>de sal</a:t>
+            </a:r>
+            <a:r>
+              <a:rPr lang="pt-BR" dirty="0" smtClean="0"/>
+              <a:t>.</a:t>
+            </a:r>
+          </a:p>
+          <a:p>
+            <a:endParaRPr lang="pt-BR" dirty="0" smtClean="0"/>
+          </a:p>
+          <a:p>
+            <a:r>
+              <a:rPr lang="pt-BR" dirty="0" smtClean="0"/>
+              <a:t>5. </a:t>
+            </a:r>
+            <a:r>
+              <a:rPr lang="pt-BR" dirty="0"/>
+              <a:t>Misturar as claras delicadamente à </a:t>
+            </a:r>
+            <a:r>
+              <a:rPr lang="pt-BR" dirty="0" smtClean="0"/>
+              <a:t>mistura.</a:t>
+            </a:r>
+          </a:p>
+          <a:p>
+            <a:endParaRPr lang="pt-BR" dirty="0" smtClean="0"/>
+          </a:p>
+          <a:p>
+            <a:r>
+              <a:rPr lang="pt-BR" dirty="0" smtClean="0"/>
+              <a:t>6. </a:t>
+            </a:r>
+            <a:r>
+              <a:rPr lang="pt-BR" dirty="0"/>
+              <a:t>Assar em forma untada e polvilhada </a:t>
+            </a:r>
+            <a:r>
+              <a:rPr lang="pt-BR" dirty="0" smtClean="0"/>
+              <a:t>com farinha </a:t>
+            </a:r>
+            <a:r>
+              <a:rPr lang="pt-BR" dirty="0"/>
+              <a:t>de trigo, em forno médio, </a:t>
+            </a:r>
+            <a:r>
+              <a:rPr lang="pt-BR" dirty="0" smtClean="0"/>
+              <a:t>por aproximadamente </a:t>
+            </a:r>
+            <a:r>
+              <a:rPr lang="pt-BR" dirty="0"/>
+              <a:t>40 minutos.</a:t>
+            </a:r>
+          </a:p>
+        </p:txBody>
+      </p:sp>
       <p:pic>
         <p:nvPicPr>
-          <p:cNvPr id="4" name="Imagem 3" descr="ras-logo.png"/>
+          <p:cNvPr id="8" name="Imagem 7" descr="ras-logo.png"/>
           <p:cNvPicPr>
             <a:picLocks noChangeAspect="1"/>
           </p:cNvPicPr>
           <p:nvPr/>
         </p:nvPicPr>
         <p:blipFill>
-          <a:blip r:embed="rId2" cstate="print"/>
+          <a:blip r:embed="rId3" cstate="print"/>
           <a:stretch>
             <a:fillRect/>
           </a:stretch>
@@ -6290,7 +6420,7 @@
           <a:p>
             <a:r>
               <a:rPr lang="pt-BR" dirty="0" smtClean="0"/>
-              <a:t>Atividade: qual o algoritmo para fazer um sanduíche?</a:t>
+              <a:t>Cada pessoa pode fazer o seu bolo de maneira diferente, mas o resultado final é o mesmo (ou parecido).</a:t>
             </a:r>
           </a:p>
           <a:p>
@@ -6299,7 +6429,7 @@
           <a:p>
             <a:r>
               <a:rPr lang="pt-BR" dirty="0" smtClean="0"/>
-              <a:t>Escrevam em um papel! Vocês tem 5 minutos!</a:t>
+              <a:t>Diferentes pessoas pensam de maneiras diferentes, ou seja, cada programador tem sua própria maneira de resolver um problema.</a:t>
             </a:r>
             <a:endParaRPr lang="pt-BR" dirty="0"/>
           </a:p>
@@ -6390,62 +6520,77 @@
           <a:chExt cx="0" cy="0"/>
         </a:xfrm>
       </p:grpSpPr>
+      <p:sp>
+        <p:nvSpPr>
+          <p:cNvPr id="2" name="Espaço Reservado para Conteúdo 1"/>
+          <p:cNvSpPr>
+            <a:spLocks noGrp="1"/>
+          </p:cNvSpPr>
+          <p:nvPr>
+            <p:ph idx="1"/>
+          </p:nvPr>
+        </p:nvSpPr>
+        <p:spPr/>
+        <p:txBody>
+          <a:bodyPr/>
+          <a:lstStyle/>
+          <a:p>
+            <a:r>
+              <a:rPr lang="pt-BR" dirty="0" smtClean="0"/>
+              <a:t>Atividade: qual o algoritmo para fazer um sanduíche?</a:t>
+            </a:r>
+          </a:p>
+          <a:p>
+            <a:endParaRPr lang="pt-BR" dirty="0" smtClean="0"/>
+          </a:p>
+          <a:p>
+            <a:r>
+              <a:rPr lang="pt-BR" dirty="0" smtClean="0"/>
+              <a:t>Escrevam em um papel! Vocês tem 5 minutos!</a:t>
+            </a:r>
+            <a:endParaRPr lang="pt-BR" dirty="0"/>
+          </a:p>
+        </p:txBody>
+      </p:sp>
+      <p:sp>
+        <p:nvSpPr>
+          <p:cNvPr id="3" name="Título 2"/>
+          <p:cNvSpPr>
+            <a:spLocks noGrp="1"/>
+          </p:cNvSpPr>
+          <p:nvPr>
+            <p:ph type="title"/>
+          </p:nvPr>
+        </p:nvSpPr>
+        <p:spPr/>
+        <p:txBody>
+          <a:bodyPr>
+            <a:normAutofit fontScale="90000"/>
+          </a:bodyPr>
+          <a:lstStyle/>
+          <a:p>
+            <a:r>
+              <a:rPr lang="pt-BR" dirty="0" smtClean="0"/>
+              <a:t>Algoritmos </a:t>
+            </a:r>
+            <a:r>
+              <a:rPr lang="pt-BR" dirty="0" err="1" smtClean="0"/>
+              <a:t>não-computacionais</a:t>
+            </a:r>
+            <a:endParaRPr lang="pt-BR" dirty="0"/>
+          </a:p>
+        </p:txBody>
+      </p:sp>
       <p:pic>
         <p:nvPicPr>
-          <p:cNvPr id="4" name="Espaço Reservado para Conteúdo 3" descr="problema_de_programador.jpg"/>
-          <p:cNvPicPr>
-            <a:picLocks noGrp="1" noChangeAspect="1"/>
-          </p:cNvPicPr>
-          <p:nvPr>
-            <p:ph idx="1"/>
-          </p:nvPr>
-        </p:nvPicPr>
-        <p:blipFill>
-          <a:blip r:embed="rId2" cstate="print"/>
-          <a:stretch>
-            <a:fillRect/>
-          </a:stretch>
-        </p:blipFill>
-        <p:spPr>
-          <a:xfrm>
-            <a:off x="2051720" y="1103883"/>
-            <a:ext cx="4984734" cy="5754117"/>
-          </a:xfrm>
-        </p:spPr>
-      </p:pic>
-      <p:sp>
-        <p:nvSpPr>
-          <p:cNvPr id="3" name="Título 2"/>
-          <p:cNvSpPr>
-            <a:spLocks noGrp="1"/>
-          </p:cNvSpPr>
-          <p:nvPr>
-            <p:ph type="title"/>
-          </p:nvPr>
-        </p:nvSpPr>
-        <p:spPr/>
-        <p:txBody>
-          <a:bodyPr/>
-          <a:lstStyle/>
-          <a:p>
-            <a:r>
-              <a:rPr lang="pt-BR" dirty="0" smtClean="0"/>
-              <a:t>Aonde está a ambiguidade?</a:t>
-            </a:r>
-            <a:endParaRPr lang="pt-BR" dirty="0"/>
-          </a:p>
-        </p:txBody>
-      </p:sp>
-      <p:pic>
-        <p:nvPicPr>
-          <p:cNvPr id="5" name="Imagem 4" descr="ras-logo.png"/>
+          <p:cNvPr id="4" name="Imagem 3" descr="ras-logo.png"/>
           <p:cNvPicPr>
             <a:picLocks noChangeAspect="1"/>
           </p:cNvPicPr>
           <p:nvPr/>
         </p:nvPicPr>
         <p:blipFill>
-          <a:blip r:embed="rId3" cstate="print"/>
+          <a:blip r:embed="rId2" cstate="print"/>
           <a:stretch>
             <a:fillRect/>
           </a:stretch>
@@ -6492,14 +6637,37 @@
           <a:chExt cx="0" cy="0"/>
         </a:xfrm>
       </p:grpSpPr>
-      <p:sp>
-        <p:nvSpPr>
-          <p:cNvPr id="2" name="Espaço Reservado para Conteúdo 1"/>
-          <p:cNvSpPr>
-            <a:spLocks noGrp="1"/>
-          </p:cNvSpPr>
+      <p:pic>
+        <p:nvPicPr>
+          <p:cNvPr id="4" name="Espaço Reservado para Conteúdo 3" descr="problema_de_programador.jpg"/>
+          <p:cNvPicPr>
+            <a:picLocks noGrp="1" noChangeAspect="1"/>
+          </p:cNvPicPr>
           <p:nvPr>
             <p:ph idx="1"/>
+          </p:nvPr>
+        </p:nvPicPr>
+        <p:blipFill>
+          <a:blip r:embed="rId2" cstate="print"/>
+          <a:stretch>
+            <a:fillRect/>
+          </a:stretch>
+        </p:blipFill>
+        <p:spPr>
+          <a:xfrm>
+            <a:off x="2051720" y="1103883"/>
+            <a:ext cx="4984734" cy="5754117"/>
+          </a:xfrm>
+        </p:spPr>
+      </p:pic>
+      <p:sp>
+        <p:nvSpPr>
+          <p:cNvPr id="3" name="Título 2"/>
+          <p:cNvSpPr>
+            <a:spLocks noGrp="1"/>
+          </p:cNvSpPr>
+          <p:nvPr>
+            <p:ph type="title"/>
           </p:nvPr>
         </p:nvSpPr>
         <p:spPr/>
@@ -6509,30 +6677,7 @@
           <a:p>
             <a:r>
               <a:rPr lang="pt-BR" dirty="0" smtClean="0"/>
-              <a:t>Para programar um computador, devemos usar um conjunto de comandos pré-existentes para dizer ao nosso robô o que ele deve fazer.</a:t>
-            </a:r>
-            <a:endParaRPr lang="pt-BR" dirty="0"/>
-          </a:p>
-        </p:txBody>
-      </p:sp>
-      <p:sp>
-        <p:nvSpPr>
-          <p:cNvPr id="3" name="Título 2"/>
-          <p:cNvSpPr>
-            <a:spLocks noGrp="1"/>
-          </p:cNvSpPr>
-          <p:nvPr>
-            <p:ph type="title"/>
-          </p:nvPr>
-        </p:nvSpPr>
-        <p:spPr/>
-        <p:txBody>
-          <a:bodyPr/>
-          <a:lstStyle/>
-          <a:p>
-            <a:r>
-              <a:rPr lang="pt-BR" dirty="0" smtClean="0"/>
-              <a:t>Algoritmos computacionais</a:t>
+              <a:t>Aonde está a ambiguidade?</a:t>
             </a:r>
             <a:endParaRPr lang="pt-BR" dirty="0"/>
           </a:p>
@@ -6540,14 +6685,14 @@
       </p:sp>
       <p:pic>
         <p:nvPicPr>
-          <p:cNvPr id="4" name="Imagem 3" descr="ras-logo.png"/>
+          <p:cNvPr id="5" name="Imagem 4" descr="ras-logo.png"/>
           <p:cNvPicPr>
             <a:picLocks noChangeAspect="1"/>
           </p:cNvPicPr>
           <p:nvPr/>
         </p:nvPicPr>
         <p:blipFill>
-          <a:blip r:embed="rId2" cstate="print"/>
+          <a:blip r:embed="rId3" cstate="print"/>
           <a:stretch>
             <a:fillRect/>
           </a:stretch>

</xml_diff>